<commit_message>
updated part 2, fixed
</commit_message>
<xml_diff>
--- a/PalMod2022/docs/2_YAML.pptx
+++ b/PalMod2022/docs/2_YAML.pptx
@@ -112,6 +112,11 @@
       </a:defRPr>
     </a:lvl9pPr>
   </p:defaultTextStyle>
+  <p:extLst>
+    <p:ext uri="{EFAFB233-063F-42B5-8137-9DF3F51BA10A}">
+      <p15:sldGuideLst xmlns:p15="http://schemas.microsoft.com/office/powerpoint/2012/main"/>
+    </p:ext>
+  </p:extLst>
 </p:presentation>
 </file>
 
@@ -3607,17 +3612,12 @@
             <a:pPr algn="ctr"/>
             <a:r>
               <a:rPr lang="tr-TR" sz="1000" smtClean="0"/>
-              <a:t>1 </a:t>
-            </a:r>
-            <a:r>
-              <a:rPr lang="tr-TR" sz="1000" smtClean="0"/>
-              <a:t>/ </a:t>
+              <a:t>1 / </a:t>
             </a:r>
             <a:r>
               <a:rPr lang="tr-TR" sz="1000"/>
               <a:t>6</a:t>
             </a:r>
-            <a:endParaRPr lang="tr-TR" sz="1000"/>
           </a:p>
         </p:txBody>
       </p:sp>
@@ -3718,7 +3718,7 @@
           <a:p>
             <a:r>
               <a:rPr lang="tr-TR" sz="4800" b="1" smtClean="0"/>
-              <a:t>      Introduction to YAML:</a:t>
+              <a:t>      Introduction to YAML</a:t>
             </a:r>
             <a:endParaRPr lang="tr-TR" sz="4800" b="1"/>
           </a:p>
@@ -4212,17 +4212,12 @@
             <a:pPr algn="ctr"/>
             <a:r>
               <a:rPr lang="tr-TR" sz="1000" smtClean="0"/>
-              <a:t>2 </a:t>
-            </a:r>
-            <a:r>
-              <a:rPr lang="tr-TR" sz="1000" smtClean="0"/>
-              <a:t>/ </a:t>
+              <a:t>2 / </a:t>
             </a:r>
             <a:r>
               <a:rPr lang="tr-TR" sz="1000"/>
               <a:t>6</a:t>
             </a:r>
-            <a:endParaRPr lang="tr-TR" sz="1000"/>
           </a:p>
         </p:txBody>
       </p:sp>
@@ -4314,15 +4309,7 @@
             </a:pPr>
             <a:r>
               <a:rPr lang="tr-TR" smtClean="0"/>
-              <a:t>Use space (eg. 4 </a:t>
-            </a:r>
-            <a:r>
-              <a:rPr lang="tr-TR" smtClean="0"/>
-              <a:t>spaces) </a:t>
-            </a:r>
-            <a:r>
-              <a:rPr lang="tr-TR" smtClean="0"/>
-              <a:t>instead of tab</a:t>
+              <a:t>Use space (eg. 4 spaces) instead of tab</a:t>
             </a:r>
             <a:endParaRPr lang="tr-TR"/>
           </a:p>
@@ -6702,7 +6689,7 @@
           <a:p>
             <a:r>
               <a:rPr lang="tr-TR" sz="3600" b="1" smtClean="0"/>
-              <a:t>  Hands-on introduction:</a:t>
+              <a:t>  Hands-on introduction</a:t>
             </a:r>
             <a:endParaRPr lang="tr-TR" sz="3600" b="1"/>
           </a:p>
@@ -6768,17 +6755,12 @@
             </a:r>
             <a:r>
               <a:rPr lang="tr-TR" sz="1000" smtClean="0"/>
-              <a:t> </a:t>
-            </a:r>
-            <a:r>
-              <a:rPr lang="tr-TR" sz="1000" smtClean="0"/>
-              <a:t>/ </a:t>
+              <a:t> / </a:t>
             </a:r>
             <a:r>
               <a:rPr lang="tr-TR" sz="1000"/>
               <a:t>6</a:t>
             </a:r>
-            <a:endParaRPr lang="tr-TR" sz="1000"/>
           </a:p>
         </p:txBody>
       </p:sp>
@@ -8379,7 +8361,7 @@
           <a:p>
             <a:r>
               <a:rPr lang="tr-TR" sz="3600" b="1" smtClean="0"/>
-              <a:t>  Hands-on introduction:</a:t>
+              <a:t>  Hands-on introduction</a:t>
             </a:r>
             <a:endParaRPr lang="tr-TR" sz="3600" b="1"/>
           </a:p>
@@ -8415,17 +8397,12 @@
             </a:r>
             <a:r>
               <a:rPr lang="tr-TR" sz="1000" smtClean="0"/>
-              <a:t> </a:t>
-            </a:r>
-            <a:r>
-              <a:rPr lang="tr-TR" sz="1000" smtClean="0"/>
-              <a:t>/ </a:t>
+              <a:t> / </a:t>
             </a:r>
             <a:r>
               <a:rPr lang="tr-TR" sz="1000"/>
               <a:t>6</a:t>
             </a:r>
-            <a:endParaRPr lang="tr-TR" sz="1000"/>
           </a:p>
         </p:txBody>
       </p:sp>
@@ -8539,7 +8516,7 @@
           <a:p>
             <a:r>
               <a:rPr lang="tr-TR" sz="4800" b="1" smtClean="0"/>
-              <a:t>      ESM-Tools Extended YAML Syntax</a:t>
+              <a:t>      ESM-Tools Extended YAML Syntax: overview</a:t>
             </a:r>
             <a:endParaRPr lang="tr-TR" sz="4800" b="1"/>
           </a:p>
@@ -9024,17 +9001,12 @@
             </a:r>
             <a:r>
               <a:rPr lang="tr-TR" sz="1000" smtClean="0"/>
-              <a:t> </a:t>
-            </a:r>
-            <a:r>
-              <a:rPr lang="tr-TR" sz="1000" smtClean="0"/>
-              <a:t>/ </a:t>
+              <a:t> / </a:t>
             </a:r>
             <a:r>
               <a:rPr lang="tr-TR" sz="1000"/>
               <a:t>6</a:t>
             </a:r>
-            <a:endParaRPr lang="tr-TR" sz="1000"/>
           </a:p>
         </p:txBody>
       </p:sp>
@@ -10220,15 +10192,7 @@
                   <a:srgbClr val="00B0F0"/>
                 </a:solidFill>
               </a:rPr>
-              <a:t>... and many </a:t>
-            </a:r>
-            <a:r>
-              <a:rPr lang="tr-TR" sz="2400" b="1" smtClean="0">
-                <a:solidFill>
-                  <a:srgbClr val="00B0F0"/>
-                </a:solidFill>
-              </a:rPr>
-              <a:t>more to come</a:t>
+              <a:t>... and many more to come</a:t>
             </a:r>
             <a:endParaRPr lang="tr-TR" sz="2400" b="1">
               <a:solidFill>
@@ -10268,17 +10232,12 @@
             </a:r>
             <a:r>
               <a:rPr lang="tr-TR" sz="1000" smtClean="0"/>
-              <a:t> </a:t>
-            </a:r>
-            <a:r>
-              <a:rPr lang="tr-TR" sz="1000" smtClean="0"/>
-              <a:t>/ </a:t>
+              <a:t> / </a:t>
             </a:r>
             <a:r>
               <a:rPr lang="tr-TR" sz="1000"/>
               <a:t>6</a:t>
             </a:r>
-            <a:endParaRPr lang="tr-TR" sz="1000"/>
           </a:p>
         </p:txBody>
       </p:sp>
@@ -10325,7 +10284,7 @@
           <a:p>
             <a:r>
               <a:rPr lang="tr-TR" sz="4800" b="1" smtClean="0"/>
-              <a:t>      ESM-Tools Extended YAML Syntax</a:t>
+              <a:t>      ESM-Tools Extended YAML Syntax: overview</a:t>
             </a:r>
             <a:endParaRPr lang="tr-TR" sz="4800" b="1"/>
           </a:p>

</xml_diff>